<commit_message>
final submission, pdf of ppt added, ppt updated
</commit_message>
<xml_diff>
--- a/EDA-MTA_presentation.pptx
+++ b/EDA-MTA_presentation.pptx
@@ -7903,7 +7903,7 @@
         </p:nvSpPr>
         <p:spPr>
           <a:xfrm>
-            <a:off x="1812010" y="1095377"/>
+            <a:off x="1812010" y="392214"/>
             <a:ext cx="9909286" cy="3036786"/>
           </a:xfrm>
           <a:solidFill>
@@ -7990,7 +7990,7 @@
                 </a:solidFill>
                 <a:latin typeface="Helvetica Neue"/>
               </a:rPr>
-              <a:t>buses, subways, and commuter rails in the Greater New York area</a:t>
+              <a:t>Stations, buses, subways, and commuter rails in the Greater New York area</a:t>
             </a:r>
           </a:p>
           <a:p>
@@ -8055,7 +8055,7 @@
         </p:nvSpPr>
         <p:spPr>
           <a:xfrm>
-            <a:off x="1812010" y="4479404"/>
+            <a:off x="1812010" y="4089938"/>
             <a:ext cx="9909285" cy="2039432"/>
           </a:xfrm>
           <a:prstGeom prst="rect">
@@ -8067,7 +8067,7 @@
         </p:spPr>
         <p:txBody>
           <a:bodyPr vert="horz" lIns="91440" tIns="45720" rIns="91440" bIns="45720" rtlCol="0">
-            <a:normAutofit/>
+            <a:normAutofit lnSpcReduction="10000"/>
           </a:bodyPr>
           <a:lstStyle>
             <a:lvl1pPr marL="342900" indent="-342900" algn="l" defTabSz="457200" rtl="0" eaLnBrk="1" latinLnBrk="0" hangingPunct="1">
@@ -8339,6 +8339,21 @@
                 <a:latin typeface="Helvetica Neue"/>
               </a:rPr>
               <a:t>Busiest stations, busiest day of the week, seasonal trends</a:t>
+            </a:r>
+          </a:p>
+          <a:p>
+            <a:pPr lvl="1">
+              <a:buFont typeface="Arial" panose="020B0604020202020204" pitchFamily="34" charset="0"/>
+              <a:buChar char="•"/>
+            </a:pPr>
+            <a:r>
+              <a:rPr lang="en-US" sz="1900" dirty="0">
+                <a:solidFill>
+                  <a:srgbClr val="333333"/>
+                </a:solidFill>
+                <a:latin typeface="Helvetica Neue"/>
+              </a:rPr>
+              <a:t>Event driven spikes in traffic</a:t>
             </a:r>
           </a:p>
           <a:p>
@@ -8394,17 +8409,19 @@
         </p:nvSpPr>
         <p:spPr>
           <a:xfrm>
-            <a:off x="2301072" y="241841"/>
+            <a:off x="2301072" y="72508"/>
             <a:ext cx="2209984" cy="752108"/>
           </a:xfrm>
         </p:spPr>
         <p:txBody>
-          <a:bodyPr/>
+          <a:bodyPr>
+            <a:normAutofit fontScale="90000"/>
+          </a:bodyPr>
           <a:lstStyle/>
           <a:p>
             <a:r>
               <a:rPr lang="en-US" dirty="0"/>
-              <a:t>Dataset	</a:t>
+              <a:t>Dataset:	</a:t>
             </a:r>
           </a:p>
         </p:txBody>
@@ -8427,7 +8444,7 @@
         </p:nvSpPr>
         <p:spPr>
           <a:xfrm>
-            <a:off x="2301072" y="861931"/>
+            <a:off x="2339172" y="667527"/>
             <a:ext cx="9323770" cy="2228509"/>
           </a:xfrm>
           <a:solidFill>
@@ -8536,7 +8553,7 @@
         </p:nvSpPr>
         <p:spPr>
           <a:xfrm>
-            <a:off x="2301073" y="3545711"/>
+            <a:off x="2339172" y="3228211"/>
             <a:ext cx="9323770" cy="2013995"/>
           </a:xfrm>
           <a:prstGeom prst="rect">
@@ -8824,6 +8841,399 @@
                 <a:latin typeface="Helvetica Neue"/>
               </a:rPr>
               <a:t>	- onto the holiday season in December, and into the new year</a:t>
+            </a:r>
+          </a:p>
+        </p:txBody>
+      </p:sp>
+      <p:sp>
+        <p:nvSpPr>
+          <p:cNvPr id="7" name="Title 1">
+            <a:extLst>
+              <a:ext uri="{FF2B5EF4-FFF2-40B4-BE49-F238E27FC236}">
+                <a16:creationId xmlns:a16="http://schemas.microsoft.com/office/drawing/2014/main" id="{E9DE6908-7510-4618-9769-70C90ADF9991}"/>
+              </a:ext>
+            </a:extLst>
+          </p:cNvPr>
+          <p:cNvSpPr txBox="1">
+            <a:spLocks/>
+          </p:cNvSpPr>
+          <p:nvPr/>
+        </p:nvSpPr>
+        <p:spPr>
+          <a:xfrm>
+            <a:off x="2301072" y="5436141"/>
+            <a:ext cx="2309028" cy="471239"/>
+          </a:xfrm>
+          <a:prstGeom prst="rect">
+            <a:avLst/>
+          </a:prstGeom>
+        </p:spPr>
+        <p:txBody>
+          <a:bodyPr vert="horz" lIns="91440" tIns="45720" rIns="91440" bIns="45720" rtlCol="0" anchor="t">
+            <a:noAutofit/>
+          </a:bodyPr>
+          <a:lstStyle>
+            <a:lvl1pPr algn="l" defTabSz="457200" rtl="0" eaLnBrk="1" latinLnBrk="0" hangingPunct="1">
+              <a:spcBef>
+                <a:spcPct val="0"/>
+              </a:spcBef>
+              <a:buNone/>
+              <a:defRPr sz="3600" kern="1200">
+                <a:solidFill>
+                  <a:schemeClr val="tx1">
+                    <a:lumMod val="85000"/>
+                    <a:lumOff val="15000"/>
+                  </a:schemeClr>
+                </a:solidFill>
+                <a:latin typeface="+mj-lt"/>
+                <a:ea typeface="+mj-ea"/>
+                <a:cs typeface="+mj-cs"/>
+              </a:defRPr>
+            </a:lvl1pPr>
+            <a:lvl2pPr eaLnBrk="1" hangingPunct="1">
+              <a:defRPr>
+                <a:solidFill>
+                  <a:schemeClr val="tx2"/>
+                </a:solidFill>
+              </a:defRPr>
+            </a:lvl2pPr>
+            <a:lvl3pPr eaLnBrk="1" hangingPunct="1">
+              <a:defRPr>
+                <a:solidFill>
+                  <a:schemeClr val="tx2"/>
+                </a:solidFill>
+              </a:defRPr>
+            </a:lvl3pPr>
+            <a:lvl4pPr eaLnBrk="1" hangingPunct="1">
+              <a:defRPr>
+                <a:solidFill>
+                  <a:schemeClr val="tx2"/>
+                </a:solidFill>
+              </a:defRPr>
+            </a:lvl4pPr>
+            <a:lvl5pPr eaLnBrk="1" hangingPunct="1">
+              <a:defRPr>
+                <a:solidFill>
+                  <a:schemeClr val="tx2"/>
+                </a:solidFill>
+              </a:defRPr>
+            </a:lvl5pPr>
+            <a:lvl6pPr eaLnBrk="1" hangingPunct="1">
+              <a:defRPr>
+                <a:solidFill>
+                  <a:schemeClr val="tx2"/>
+                </a:solidFill>
+              </a:defRPr>
+            </a:lvl6pPr>
+            <a:lvl7pPr eaLnBrk="1" hangingPunct="1">
+              <a:defRPr>
+                <a:solidFill>
+                  <a:schemeClr val="tx2"/>
+                </a:solidFill>
+              </a:defRPr>
+            </a:lvl7pPr>
+            <a:lvl8pPr eaLnBrk="1" hangingPunct="1">
+              <a:defRPr>
+                <a:solidFill>
+                  <a:schemeClr val="tx2"/>
+                </a:solidFill>
+              </a:defRPr>
+            </a:lvl8pPr>
+            <a:lvl9pPr eaLnBrk="1" hangingPunct="1">
+              <a:defRPr>
+                <a:solidFill>
+                  <a:schemeClr val="tx2"/>
+                </a:solidFill>
+              </a:defRPr>
+            </a:lvl9pPr>
+          </a:lstStyle>
+          <a:p>
+            <a:r>
+              <a:rPr lang="en-US" sz="3200" dirty="0"/>
+              <a:t>Tools used:	</a:t>
+            </a:r>
+          </a:p>
+        </p:txBody>
+      </p:sp>
+      <p:sp>
+        <p:nvSpPr>
+          <p:cNvPr id="8" name="Content Placeholder 2">
+            <a:extLst>
+              <a:ext uri="{FF2B5EF4-FFF2-40B4-BE49-F238E27FC236}">
+                <a16:creationId xmlns:a16="http://schemas.microsoft.com/office/drawing/2014/main" id="{6CF55F5B-055C-4F9B-BEFA-3879B8FCCFDE}"/>
+              </a:ext>
+            </a:extLst>
+          </p:cNvPr>
+          <p:cNvSpPr txBox="1">
+            <a:spLocks/>
+          </p:cNvSpPr>
+          <p:nvPr/>
+        </p:nvSpPr>
+        <p:spPr>
+          <a:xfrm>
+            <a:off x="2339172" y="5998634"/>
+            <a:ext cx="6165595" cy="471240"/>
+          </a:xfrm>
+          <a:prstGeom prst="rect">
+            <a:avLst/>
+          </a:prstGeom>
+          <a:solidFill>
+            <a:schemeClr val="bg1"/>
+          </a:solidFill>
+        </p:spPr>
+        <p:txBody>
+          <a:bodyPr vert="horz" lIns="91440" tIns="45720" rIns="91440" bIns="45720" rtlCol="0">
+            <a:normAutofit/>
+          </a:bodyPr>
+          <a:lstStyle>
+            <a:lvl1pPr marL="342900" indent="-342900" algn="l" defTabSz="457200" rtl="0" eaLnBrk="1" latinLnBrk="0" hangingPunct="1">
+              <a:spcBef>
+                <a:spcPts val="1000"/>
+              </a:spcBef>
+              <a:spcAft>
+                <a:spcPts val="0"/>
+              </a:spcAft>
+              <a:buClr>
+                <a:schemeClr val="accent1"/>
+              </a:buClr>
+              <a:buFont typeface="Wingdings 3" charset="2"/>
+              <a:buChar char=""/>
+              <a:defRPr sz="1800" kern="1200">
+                <a:solidFill>
+                  <a:schemeClr val="tx1">
+                    <a:lumMod val="75000"/>
+                    <a:lumOff val="25000"/>
+                  </a:schemeClr>
+                </a:solidFill>
+                <a:latin typeface="+mn-lt"/>
+                <a:ea typeface="+mn-ea"/>
+                <a:cs typeface="+mn-cs"/>
+              </a:defRPr>
+            </a:lvl1pPr>
+            <a:lvl2pPr marL="742950" indent="-285750" algn="l" defTabSz="457200" rtl="0" eaLnBrk="1" latinLnBrk="0" hangingPunct="1">
+              <a:spcBef>
+                <a:spcPts val="1000"/>
+              </a:spcBef>
+              <a:spcAft>
+                <a:spcPts val="0"/>
+              </a:spcAft>
+              <a:buClr>
+                <a:schemeClr val="accent1"/>
+              </a:buClr>
+              <a:buFont typeface="Wingdings 3" charset="2"/>
+              <a:buChar char=""/>
+              <a:defRPr sz="1600" kern="1200">
+                <a:solidFill>
+                  <a:schemeClr val="tx1">
+                    <a:lumMod val="75000"/>
+                    <a:lumOff val="25000"/>
+                  </a:schemeClr>
+                </a:solidFill>
+                <a:latin typeface="+mn-lt"/>
+                <a:ea typeface="+mn-ea"/>
+                <a:cs typeface="+mn-cs"/>
+              </a:defRPr>
+            </a:lvl2pPr>
+            <a:lvl3pPr marL="1143000" indent="-228600" algn="l" defTabSz="457200" rtl="0" eaLnBrk="1" latinLnBrk="0" hangingPunct="1">
+              <a:spcBef>
+                <a:spcPts val="1000"/>
+              </a:spcBef>
+              <a:spcAft>
+                <a:spcPts val="0"/>
+              </a:spcAft>
+              <a:buClr>
+                <a:schemeClr val="accent1"/>
+              </a:buClr>
+              <a:buFont typeface="Wingdings 3" charset="2"/>
+              <a:buChar char=""/>
+              <a:defRPr sz="1400" kern="1200">
+                <a:solidFill>
+                  <a:schemeClr val="tx1">
+                    <a:lumMod val="75000"/>
+                    <a:lumOff val="25000"/>
+                  </a:schemeClr>
+                </a:solidFill>
+                <a:latin typeface="+mn-lt"/>
+                <a:ea typeface="+mn-ea"/>
+                <a:cs typeface="+mn-cs"/>
+              </a:defRPr>
+            </a:lvl3pPr>
+            <a:lvl4pPr marL="1600200" indent="-228600" algn="l" defTabSz="457200" rtl="0" eaLnBrk="1" latinLnBrk="0" hangingPunct="1">
+              <a:spcBef>
+                <a:spcPts val="1000"/>
+              </a:spcBef>
+              <a:spcAft>
+                <a:spcPts val="0"/>
+              </a:spcAft>
+              <a:buClr>
+                <a:schemeClr val="accent1"/>
+              </a:buClr>
+              <a:buFont typeface="Wingdings 3" charset="2"/>
+              <a:buChar char=""/>
+              <a:defRPr sz="1200" kern="1200">
+                <a:solidFill>
+                  <a:schemeClr val="tx1">
+                    <a:lumMod val="75000"/>
+                    <a:lumOff val="25000"/>
+                  </a:schemeClr>
+                </a:solidFill>
+                <a:latin typeface="+mn-lt"/>
+                <a:ea typeface="+mn-ea"/>
+                <a:cs typeface="+mn-cs"/>
+              </a:defRPr>
+            </a:lvl4pPr>
+            <a:lvl5pPr marL="2057400" indent="-228600" algn="l" defTabSz="457200" rtl="0" eaLnBrk="1" latinLnBrk="0" hangingPunct="1">
+              <a:spcBef>
+                <a:spcPts val="1000"/>
+              </a:spcBef>
+              <a:spcAft>
+                <a:spcPts val="0"/>
+              </a:spcAft>
+              <a:buClr>
+                <a:schemeClr val="accent1"/>
+              </a:buClr>
+              <a:buFont typeface="Wingdings 3" charset="2"/>
+              <a:buChar char=""/>
+              <a:defRPr sz="1200" kern="1200">
+                <a:solidFill>
+                  <a:schemeClr val="tx1">
+                    <a:lumMod val="75000"/>
+                    <a:lumOff val="25000"/>
+                  </a:schemeClr>
+                </a:solidFill>
+                <a:latin typeface="+mn-lt"/>
+                <a:ea typeface="+mn-ea"/>
+                <a:cs typeface="+mn-cs"/>
+              </a:defRPr>
+            </a:lvl5pPr>
+            <a:lvl6pPr marL="2514600" indent="-228600" algn="l" defTabSz="457200" rtl="0" eaLnBrk="1" latinLnBrk="0" hangingPunct="1">
+              <a:spcBef>
+                <a:spcPts val="1000"/>
+              </a:spcBef>
+              <a:spcAft>
+                <a:spcPts val="0"/>
+              </a:spcAft>
+              <a:buClr>
+                <a:schemeClr val="accent1"/>
+              </a:buClr>
+              <a:buFont typeface="Wingdings 3" charset="2"/>
+              <a:buChar char=""/>
+              <a:defRPr sz="1200" kern="1200">
+                <a:solidFill>
+                  <a:schemeClr val="tx1">
+                    <a:lumMod val="75000"/>
+                    <a:lumOff val="25000"/>
+                  </a:schemeClr>
+                </a:solidFill>
+                <a:latin typeface="+mn-lt"/>
+                <a:ea typeface="+mn-ea"/>
+                <a:cs typeface="+mn-cs"/>
+              </a:defRPr>
+            </a:lvl6pPr>
+            <a:lvl7pPr marL="2971800" indent="-228600" algn="l" defTabSz="457200" rtl="0" eaLnBrk="1" latinLnBrk="0" hangingPunct="1">
+              <a:spcBef>
+                <a:spcPts val="1000"/>
+              </a:spcBef>
+              <a:spcAft>
+                <a:spcPts val="0"/>
+              </a:spcAft>
+              <a:buClr>
+                <a:schemeClr val="accent1"/>
+              </a:buClr>
+              <a:buFont typeface="Wingdings 3" charset="2"/>
+              <a:buChar char=""/>
+              <a:defRPr sz="1200" kern="1200">
+                <a:solidFill>
+                  <a:schemeClr val="tx1">
+                    <a:lumMod val="75000"/>
+                    <a:lumOff val="25000"/>
+                  </a:schemeClr>
+                </a:solidFill>
+                <a:latin typeface="+mn-lt"/>
+                <a:ea typeface="+mn-ea"/>
+                <a:cs typeface="+mn-cs"/>
+              </a:defRPr>
+            </a:lvl7pPr>
+            <a:lvl8pPr marL="3429000" indent="-228600" algn="l" defTabSz="457200" rtl="0" eaLnBrk="1" latinLnBrk="0" hangingPunct="1">
+              <a:spcBef>
+                <a:spcPts val="1000"/>
+              </a:spcBef>
+              <a:spcAft>
+                <a:spcPts val="0"/>
+              </a:spcAft>
+              <a:buClr>
+                <a:schemeClr val="accent1"/>
+              </a:buClr>
+              <a:buFont typeface="Wingdings 3" charset="2"/>
+              <a:buChar char=""/>
+              <a:defRPr sz="1200" kern="1200">
+                <a:solidFill>
+                  <a:schemeClr val="tx1">
+                    <a:lumMod val="75000"/>
+                    <a:lumOff val="25000"/>
+                  </a:schemeClr>
+                </a:solidFill>
+                <a:latin typeface="+mn-lt"/>
+                <a:ea typeface="+mn-ea"/>
+                <a:cs typeface="+mn-cs"/>
+              </a:defRPr>
+            </a:lvl8pPr>
+            <a:lvl9pPr marL="3886200" indent="-228600" algn="l" defTabSz="457200" rtl="0" eaLnBrk="1" latinLnBrk="0" hangingPunct="1">
+              <a:spcBef>
+                <a:spcPts val="1000"/>
+              </a:spcBef>
+              <a:spcAft>
+                <a:spcPts val="0"/>
+              </a:spcAft>
+              <a:buClr>
+                <a:schemeClr val="accent1"/>
+              </a:buClr>
+              <a:buFont typeface="Wingdings 3" charset="2"/>
+              <a:buChar char=""/>
+              <a:defRPr sz="1200" kern="1200">
+                <a:solidFill>
+                  <a:schemeClr val="tx1">
+                    <a:lumMod val="75000"/>
+                    <a:lumOff val="25000"/>
+                  </a:schemeClr>
+                </a:solidFill>
+                <a:latin typeface="+mn-lt"/>
+                <a:ea typeface="+mn-ea"/>
+                <a:cs typeface="+mn-cs"/>
+              </a:defRPr>
+            </a:lvl9pPr>
+          </a:lstStyle>
+          <a:p>
+            <a:pPr>
+              <a:buFontTx/>
+              <a:buChar char="-"/>
+            </a:pPr>
+            <a:r>
+              <a:rPr lang="en-US" sz="2100" dirty="0">
+                <a:solidFill>
+                  <a:srgbClr val="333333"/>
+                </a:solidFill>
+                <a:latin typeface="Helvetica Neue"/>
+              </a:rPr>
+              <a:t>SQL, SQLAlchemy, Pandas, </a:t>
+            </a:r>
+            <a:r>
+              <a:rPr lang="en-US" sz="2100" dirty="0" err="1">
+                <a:solidFill>
+                  <a:srgbClr val="333333"/>
+                </a:solidFill>
+                <a:latin typeface="Helvetica Neue"/>
+              </a:rPr>
+              <a:t>Numpy</a:t>
+            </a:r>
+            <a:r>
+              <a:rPr lang="en-US" sz="2100" dirty="0">
+                <a:solidFill>
+                  <a:srgbClr val="333333"/>
+                </a:solidFill>
+                <a:latin typeface="Helvetica Neue"/>
+              </a:rPr>
+              <a:t>, Matplotlib</a:t>
             </a:r>
           </a:p>
         </p:txBody>
@@ -8872,7 +9282,7 @@
         </p:nvSpPr>
         <p:spPr>
           <a:xfrm>
-            <a:off x="1639748" y="320233"/>
+            <a:off x="1593181" y="211667"/>
             <a:ext cx="9842339" cy="5027271"/>
           </a:xfrm>
           <a:prstGeom prst="rect">
@@ -8953,8 +9363,8 @@
         </p:nvSpPr>
         <p:spPr>
           <a:xfrm>
-            <a:off x="2478314" y="5516133"/>
-            <a:ext cx="8165203" cy="1200329"/>
+            <a:off x="1790856" y="5319899"/>
+            <a:ext cx="9540119" cy="1477328"/>
           </a:xfrm>
           <a:prstGeom prst="rect">
             <a:avLst/>
@@ -8996,7 +9406,7 @@
                 </a:solidFill>
                 <a:latin typeface="Helvetica Neue"/>
               </a:rPr>
-              <a:t> more people exit the stations than enter; also true for ALL stations combined </a:t>
+              <a:t> more people exit the stations than enter; NOTE: also true for ALL stations combined, 3.7% that enter, exit at stations not covered by the dataset (e.g. commuter rails in other states)</a:t>
             </a:r>
           </a:p>
           <a:p>
@@ -9058,7 +9468,7 @@
         </p:blipFill>
         <p:spPr>
           <a:xfrm>
-            <a:off x="2446631" y="632469"/>
+            <a:off x="2446631" y="480069"/>
             <a:ext cx="8228571" cy="4571428"/>
           </a:xfrm>
           <a:prstGeom prst="rect">
@@ -9231,7 +9641,7 @@
         </p:nvSpPr>
         <p:spPr>
           <a:xfrm>
-            <a:off x="2468578" y="5494867"/>
+            <a:off x="2701411" y="5490634"/>
             <a:ext cx="7985790" cy="1200329"/>
           </a:xfrm>
           <a:prstGeom prst="rect">
@@ -9307,7 +9717,7 @@
                 </a:solidFill>
                 <a:latin typeface="Helvetica Neue"/>
               </a:rPr>
-              <a:t>Spike in Exits of Friday: time to party in the city after work, ride cab back home after subway closes</a:t>
+              <a:t>Spike in Exits on Friday: time to party in the city after work, ride cab back home after subway closes</a:t>
             </a:r>
             <a:endParaRPr lang="en-US" b="0" i="0" dirty="0">
               <a:solidFill>
@@ -9417,8 +9827,8 @@
         </p:nvSpPr>
         <p:spPr>
           <a:xfrm>
-            <a:off x="4607434" y="5029201"/>
-            <a:ext cx="3527778" cy="1631216"/>
+            <a:off x="2465366" y="5058834"/>
+            <a:ext cx="7834334" cy="1631216"/>
           </a:xfrm>
           <a:prstGeom prst="rect">
             <a:avLst/>
@@ -9443,7 +9853,7 @@
                 <a:effectLst/>
                 <a:latin typeface="Helvetica Neue"/>
               </a:rPr>
-              <a:t> Weekly cyclical trends</a:t>
+              <a:t> Weekly cyclical trend (peak during weekdays, drop on weekends)</a:t>
             </a:r>
           </a:p>
           <a:p>
@@ -9509,8 +9919,24 @@
                 <a:effectLst/>
                 <a:latin typeface="Helvetica Neue"/>
               </a:rPr>
-              <a:t> 3 unusual spikes in traffic: </a:t>
-            </a:r>
+              <a:t> 3 unusual spikes in traffic</a:t>
+            </a:r>
+            <a:r>
+              <a:rPr lang="en-US" sz="2000" dirty="0">
+                <a:solidFill>
+                  <a:srgbClr val="333333"/>
+                </a:solidFill>
+                <a:latin typeface="Helvetica Neue"/>
+              </a:rPr>
+              <a:t> after capping count at 200,000</a:t>
+            </a:r>
+            <a:endParaRPr lang="en-US" sz="2000" b="0" i="0" dirty="0">
+              <a:solidFill>
+                <a:srgbClr val="333333"/>
+              </a:solidFill>
+              <a:effectLst/>
+              <a:latin typeface="Helvetica Neue"/>
+            </a:endParaRPr>
           </a:p>
         </p:txBody>
       </p:sp>
@@ -10399,6 +10825,58 @@
           </a:fontRef>
         </p:style>
       </p:cxnSp>
+      <p:sp>
+        <p:nvSpPr>
+          <p:cNvPr id="2" name="Rectangle 1">
+            <a:extLst>
+              <a:ext uri="{FF2B5EF4-FFF2-40B4-BE49-F238E27FC236}">
+                <a16:creationId xmlns:a16="http://schemas.microsoft.com/office/drawing/2014/main" id="{51F084F2-5B0D-4302-B76E-72EEFCBC33AD}"/>
+              </a:ext>
+            </a:extLst>
+          </p:cNvPr>
+          <p:cNvSpPr/>
+          <p:nvPr/>
+        </p:nvSpPr>
+        <p:spPr>
+          <a:xfrm>
+            <a:off x="4889500" y="2112433"/>
+            <a:ext cx="3759816" cy="1092200"/>
+          </a:xfrm>
+          <a:prstGeom prst="rect">
+            <a:avLst/>
+          </a:prstGeom>
+          <a:noFill/>
+          <a:ln>
+            <a:solidFill>
+              <a:srgbClr val="FF0000"/>
+            </a:solidFill>
+          </a:ln>
+        </p:spPr>
+        <p:style>
+          <a:lnRef idx="2">
+            <a:schemeClr val="accent1">
+              <a:shade val="50000"/>
+            </a:schemeClr>
+          </a:lnRef>
+          <a:fillRef idx="1">
+            <a:schemeClr val="accent1"/>
+          </a:fillRef>
+          <a:effectRef idx="0">
+            <a:schemeClr val="accent1"/>
+          </a:effectRef>
+          <a:fontRef idx="minor">
+            <a:schemeClr val="lt1"/>
+          </a:fontRef>
+        </p:style>
+        <p:txBody>
+          <a:bodyPr rtlCol="0" anchor="ctr"/>
+          <a:lstStyle/>
+          <a:p>
+            <a:pPr algn="ctr"/>
+            <a:endParaRPr lang="en-US" dirty="0"/>
+          </a:p>
+        </p:txBody>
+      </p:sp>
     </p:spTree>
     <p:extLst>
       <p:ext uri="{BB962C8B-B14F-4D97-AF65-F5344CB8AC3E}">

</xml_diff>